<commit_message>
day 3 updates, and more
</commit_message>
<xml_diff>
--- a/slides/day1_slides.pptx
+++ b/slides/day1_slides.pptx
@@ -267,7 +267,7 @@
           <a:p>
             <a:fld id="{F833E4A7-8C8F-0444-B05A-6DE0ED7B35B0}" type="datetimeFigureOut">
               <a:rPr lang="en-US" smtClean="0"/>
-              <a:t>5/15/15</a:t>
+              <a:t>5/17/15</a:t>
             </a:fld>
             <a:endParaRPr lang="en-US"/>
           </a:p>
@@ -1196,7 +1196,7 @@
           <a:p>
             <a:fld id="{CAF647BD-C221-1844-9ED2-A7F7759EF665}" type="datetimeFigureOut">
               <a:rPr lang="en-US" smtClean="0"/>
-              <a:t>5/15/15</a:t>
+              <a:t>5/17/15</a:t>
             </a:fld>
             <a:endParaRPr lang="en-US"/>
           </a:p>
@@ -1461,7 +1461,7 @@
           <a:p>
             <a:fld id="{CAF647BD-C221-1844-9ED2-A7F7759EF665}" type="datetimeFigureOut">
               <a:rPr lang="en-US" smtClean="0"/>
-              <a:t>5/15/15</a:t>
+              <a:t>5/17/15</a:t>
             </a:fld>
             <a:endParaRPr lang="en-US"/>
           </a:p>
@@ -1636,7 +1636,7 @@
           <a:p>
             <a:fld id="{CAF647BD-C221-1844-9ED2-A7F7759EF665}" type="datetimeFigureOut">
               <a:rPr lang="en-US" smtClean="0"/>
-              <a:t>5/15/15</a:t>
+              <a:t>5/17/15</a:t>
             </a:fld>
             <a:endParaRPr lang="en-US"/>
           </a:p>
@@ -1801,7 +1801,7 @@
           <a:p>
             <a:fld id="{CAF647BD-C221-1844-9ED2-A7F7759EF665}" type="datetimeFigureOut">
               <a:rPr lang="en-US" smtClean="0"/>
-              <a:t>5/15/15</a:t>
+              <a:t>5/17/15</a:t>
             </a:fld>
             <a:endParaRPr lang="en-US"/>
           </a:p>
@@ -2050,7 +2050,7 @@
           <a:p>
             <a:fld id="{CAF647BD-C221-1844-9ED2-A7F7759EF665}" type="datetimeFigureOut">
               <a:rPr lang="en-US" smtClean="0"/>
-              <a:t>5/15/15</a:t>
+              <a:t>5/17/15</a:t>
             </a:fld>
             <a:endParaRPr lang="en-US"/>
           </a:p>
@@ -2333,7 +2333,7 @@
           <a:p>
             <a:fld id="{CAF647BD-C221-1844-9ED2-A7F7759EF665}" type="datetimeFigureOut">
               <a:rPr lang="en-US" smtClean="0"/>
-              <a:t>5/15/15</a:t>
+              <a:t>5/17/15</a:t>
             </a:fld>
             <a:endParaRPr lang="en-US"/>
           </a:p>
@@ -2772,7 +2772,7 @@
           <a:p>
             <a:fld id="{CAF647BD-C221-1844-9ED2-A7F7759EF665}" type="datetimeFigureOut">
               <a:rPr lang="en-US" smtClean="0"/>
-              <a:t>5/15/15</a:t>
+              <a:t>5/17/15</a:t>
             </a:fld>
             <a:endParaRPr lang="en-US"/>
           </a:p>
@@ -2885,7 +2885,7 @@
           <a:p>
             <a:fld id="{CAF647BD-C221-1844-9ED2-A7F7759EF665}" type="datetimeFigureOut">
               <a:rPr lang="en-US" smtClean="0"/>
-              <a:t>5/15/15</a:t>
+              <a:t>5/17/15</a:t>
             </a:fld>
             <a:endParaRPr lang="en-US"/>
           </a:p>
@@ -2975,7 +2975,7 @@
           <a:p>
             <a:fld id="{CAF647BD-C221-1844-9ED2-A7F7759EF665}" type="datetimeFigureOut">
               <a:rPr lang="en-US" smtClean="0"/>
-              <a:t>5/15/15</a:t>
+              <a:t>5/17/15</a:t>
             </a:fld>
             <a:endParaRPr lang="en-US"/>
           </a:p>
@@ -3217,7 +3217,7 @@
           <a:p>
             <a:fld id="{CAF647BD-C221-1844-9ED2-A7F7759EF665}" type="datetimeFigureOut">
               <a:rPr lang="en-US" smtClean="0"/>
-              <a:t>5/15/15</a:t>
+              <a:t>5/17/15</a:t>
             </a:fld>
             <a:endParaRPr lang="en-US"/>
           </a:p>
@@ -3511,7 +3511,7 @@
           <a:p>
             <a:fld id="{CAF647BD-C221-1844-9ED2-A7F7759EF665}" type="datetimeFigureOut">
               <a:rPr lang="en-US" smtClean="0"/>
-              <a:t>5/15/15</a:t>
+              <a:t>5/17/15</a:t>
             </a:fld>
             <a:endParaRPr lang="en-US"/>
           </a:p>
@@ -3805,7 +3805,7 @@
           <a:p>
             <a:fld id="{CAF647BD-C221-1844-9ED2-A7F7759EF665}" type="datetimeFigureOut">
               <a:rPr lang="en-US" smtClean="0"/>
-              <a:t>5/15/15</a:t>
+              <a:t>5/17/15</a:t>
             </a:fld>
             <a:endParaRPr lang="en-US"/>
           </a:p>
@@ -4315,7 +4315,7 @@
       </p:sp>
       <p:sp>
         <p:nvSpPr>
-          <p:cNvPr id="3" name="Subtitle 2"/>
+          <p:cNvPr id="5" name="Subtitle 2"/>
           <p:cNvSpPr>
             <a:spLocks noGrp="1"/>
           </p:cNvSpPr>
@@ -4323,24 +4323,60 @@
             <p:ph type="subTitle" idx="1"/>
           </p:nvPr>
         </p:nvSpPr>
-        <p:spPr/>
+        <p:spPr>
+          <a:xfrm>
+            <a:off x="457199" y="4800599"/>
+            <a:ext cx="8491415" cy="1578709"/>
+          </a:xfrm>
+        </p:spPr>
         <p:txBody>
           <a:bodyPr>
-            <a:normAutofit fontScale="62500" lnSpcReduction="20000"/>
+            <a:normAutofit fontScale="55000" lnSpcReduction="20000"/>
           </a:bodyPr>
           <a:lstStyle/>
           <a:p>
             <a:r>
               <a:rPr lang="en-US" dirty="0" smtClean="0"/>
-              <a:t>Stephanie Spielman</a:t>
-            </a:r>
-          </a:p>
-          <a:p>
+              <a:t>Stephanie </a:t>
+            </a:r>
             <a:r>
               <a:rPr lang="en-US" dirty="0" smtClean="0"/>
-              <a:t>UT CCBB Big data in biology summer school, 2015</a:t>
-            </a:r>
-            <a:endParaRPr lang="en-US" dirty="0"/>
+              <a:t>Spielman</a:t>
+            </a:r>
+          </a:p>
+          <a:p>
+            <a:endParaRPr lang="en-US" dirty="0" smtClean="0"/>
+          </a:p>
+          <a:p>
+            <a:r>
+              <a:rPr lang="en-US" dirty="0" smtClean="0"/>
+              <a:t>Big </a:t>
+            </a:r>
+            <a:r>
+              <a:rPr lang="en-US" dirty="0" smtClean="0"/>
+              <a:t>data in biology summer school, </a:t>
+            </a:r>
+            <a:r>
+              <a:rPr lang="en-US" dirty="0" smtClean="0"/>
+              <a:t>2015</a:t>
+            </a:r>
+          </a:p>
+          <a:p>
+            <a:r>
+              <a:rPr lang="en-US" dirty="0"/>
+              <a:t>Center for computational biology and bioinformatics </a:t>
+            </a:r>
+          </a:p>
+          <a:p>
+            <a:r>
+              <a:rPr lang="en-US" dirty="0" smtClean="0"/>
+              <a:t>University of Texas at </a:t>
+            </a:r>
+            <a:r>
+              <a:rPr lang="en-US" dirty="0" err="1" smtClean="0"/>
+              <a:t>austin</a:t>
+            </a:r>
+            <a:endParaRPr lang="en-US" dirty="0" smtClean="0"/>
           </a:p>
         </p:txBody>
       </p:sp>

</xml_diff>